<commit_message>
Resolução e análise de inconsistência na comparação de arvores
Resolução e análise de inconsistência na comparação de arvores
</commit_message>
<xml_diff>
--- a/apresentacoes/Reunião_Orientação_TCC 20_01_2023.pptx
+++ b/apresentacoes/Reunião_Orientação_TCC 20_01_2023.pptx
@@ -400,7 +400,7 @@
           <a:p>
             <a:fld id="{588D7303-1349-4B3B-906B-0AD17F7A84D3}" type="datetimeFigureOut">
               <a:rPr lang="pt-BR" smtClean="0"/>
-              <a:t>16/01/2023</a:t>
+              <a:t>19/01/2023</a:t>
             </a:fld>
             <a:endParaRPr lang="pt-BR"/>
           </a:p>
@@ -608,7 +608,7 @@
           <a:p>
             <a:fld id="{588D7303-1349-4B3B-906B-0AD17F7A84D3}" type="datetimeFigureOut">
               <a:rPr lang="pt-BR" smtClean="0"/>
-              <a:t>16/01/2023</a:t>
+              <a:t>19/01/2023</a:t>
             </a:fld>
             <a:endParaRPr lang="pt-BR"/>
           </a:p>
@@ -806,7 +806,7 @@
           <a:p>
             <a:fld id="{588D7303-1349-4B3B-906B-0AD17F7A84D3}" type="datetimeFigureOut">
               <a:rPr lang="pt-BR" smtClean="0"/>
-              <a:t>16/01/2023</a:t>
+              <a:t>19/01/2023</a:t>
             </a:fld>
             <a:endParaRPr lang="pt-BR"/>
           </a:p>
@@ -1081,7 +1081,7 @@
           <a:p>
             <a:fld id="{588D7303-1349-4B3B-906B-0AD17F7A84D3}" type="datetimeFigureOut">
               <a:rPr lang="pt-BR" smtClean="0"/>
-              <a:t>16/01/2023</a:t>
+              <a:t>19/01/2023</a:t>
             </a:fld>
             <a:endParaRPr lang="pt-BR"/>
           </a:p>
@@ -1346,7 +1346,7 @@
           <a:p>
             <a:fld id="{588D7303-1349-4B3B-906B-0AD17F7A84D3}" type="datetimeFigureOut">
               <a:rPr lang="pt-BR" smtClean="0"/>
-              <a:t>16/01/2023</a:t>
+              <a:t>19/01/2023</a:t>
             </a:fld>
             <a:endParaRPr lang="pt-BR"/>
           </a:p>
@@ -1758,7 +1758,7 @@
           <a:p>
             <a:fld id="{588D7303-1349-4B3B-906B-0AD17F7A84D3}" type="datetimeFigureOut">
               <a:rPr lang="pt-BR" smtClean="0"/>
-              <a:t>16/01/2023</a:t>
+              <a:t>19/01/2023</a:t>
             </a:fld>
             <a:endParaRPr lang="pt-BR"/>
           </a:p>
@@ -1899,7 +1899,7 @@
           <a:p>
             <a:fld id="{588D7303-1349-4B3B-906B-0AD17F7A84D3}" type="datetimeFigureOut">
               <a:rPr lang="pt-BR" smtClean="0"/>
-              <a:t>16/01/2023</a:t>
+              <a:t>19/01/2023</a:t>
             </a:fld>
             <a:endParaRPr lang="pt-BR"/>
           </a:p>
@@ -2012,7 +2012,7 @@
           <a:p>
             <a:fld id="{588D7303-1349-4B3B-906B-0AD17F7A84D3}" type="datetimeFigureOut">
               <a:rPr lang="pt-BR" smtClean="0"/>
-              <a:t>16/01/2023</a:t>
+              <a:t>19/01/2023</a:t>
             </a:fld>
             <a:endParaRPr lang="pt-BR"/>
           </a:p>
@@ -2323,7 +2323,7 @@
           <a:p>
             <a:fld id="{588D7303-1349-4B3B-906B-0AD17F7A84D3}" type="datetimeFigureOut">
               <a:rPr lang="pt-BR" smtClean="0"/>
-              <a:t>16/01/2023</a:t>
+              <a:t>19/01/2023</a:t>
             </a:fld>
             <a:endParaRPr lang="pt-BR"/>
           </a:p>
@@ -2611,7 +2611,7 @@
           <a:p>
             <a:fld id="{588D7303-1349-4B3B-906B-0AD17F7A84D3}" type="datetimeFigureOut">
               <a:rPr lang="pt-BR" smtClean="0"/>
-              <a:t>16/01/2023</a:t>
+              <a:t>19/01/2023</a:t>
             </a:fld>
             <a:endParaRPr lang="pt-BR"/>
           </a:p>
@@ -2861,7 +2861,7 @@
           <a:p>
             <a:fld id="{588D7303-1349-4B3B-906B-0AD17F7A84D3}" type="datetimeFigureOut">
               <a:rPr lang="pt-BR" smtClean="0"/>
-              <a:t>16/01/2023</a:t>
+              <a:t>19/01/2023</a:t>
             </a:fld>
             <a:endParaRPr lang="pt-BR"/>
           </a:p>
@@ -3480,12 +3480,12 @@
         <p:spPr>
           <a:xfrm>
             <a:off x="339634" y="0"/>
-            <a:ext cx="11312435" cy="6412327"/>
+            <a:ext cx="11312435" cy="6599583"/>
           </a:xfrm>
         </p:spPr>
         <p:txBody>
           <a:bodyPr>
-            <a:normAutofit/>
+            <a:normAutofit fontScale="92500" lnSpcReduction="20000"/>
           </a:bodyPr>
           <a:lstStyle/>
           <a:p>
@@ -3533,11 +3533,11 @@
                 <a:latin typeface="Arial" panose="020B0604020202020204" pitchFamily="34" charset="0"/>
                 <a:ea typeface="Arial" panose="020B0604020202020204" pitchFamily="34" charset="0"/>
               </a:rPr>
-              <a:t>:   Uma dúvida que me surgiu relendo o trabalho: É possível que alguma unidade ativa ao longo de 4 anos não emita nenhum ato?</a:t>
-            </a:r>
-          </a:p>
-          <a:p>
-            <a:pPr marL="0" lvl="0" indent="0">
+              <a:t>:   Uma dúvida que me surgiu relendo o trabalho: É possível que alguma unidade ativa ao longo de 4 anos não emita nenhum ato? Ao final do texto, ainda na primeira versão fiquei com um questionamento que lhe transmito agora. Ao observar os seis novos vértices no ano de 2022 comparado ao ano de 2019 entendo que eles remetem a novas unidades fundadas neste período. Contudo, pensando na UFLA (Federal de Lavras) a mesma já existe há algum bom tempo, então meu questionamento é no sentido de: será que no ano de 2019 não houve nenhum registro no DOU contendo a UFLA e em 2022 sim? Logo, ela não seria uma unidade nova, mas apenas uma unidade que em 2019 não apresentou registro e em 2022 sim. Acredito que seja interessante você analisar os 6 novos vértices. Verifique e transcreva no texto o ano de fundação, se as mesmas aparecem nas análises de 2020 e 2021 (não precisa colocar os grafos desses anos).</a:t>
+            </a:r>
+          </a:p>
+          <a:p>
+            <a:pPr marL="457200" lvl="1" indent="0">
               <a:lnSpc>
                 <a:spcPct val="150000"/>
               </a:lnSpc>
@@ -3545,7 +3545,7 @@
               <a:buNone/>
             </a:pPr>
             <a:r>
-              <a:rPr lang="pt-BR" sz="1700" b="1" dirty="0">
+              <a:rPr lang="pt-BR" sz="1300" b="1" dirty="0">
                 <a:solidFill>
                   <a:srgbClr val="000000"/>
                 </a:solidFill>
@@ -3683,7 +3683,7 @@
         </p:nvSpPr>
         <p:spPr>
           <a:xfrm>
-            <a:off x="4659683" y="5912285"/>
+            <a:off x="4646431" y="6230251"/>
             <a:ext cx="2428806" cy="369332"/>
           </a:xfrm>
           <a:prstGeom prst="rect">

</xml_diff>